<commit_message>
Added new static class to using static demo. Added event handling to null conditional demo. Added to nameof demo. Fixed property in expression bodied member demo. Added AsyncEnhancements project. Updated slides.
</commit_message>
<xml_diff>
--- a/What’s New in CSharp.pptx
+++ b/What’s New in CSharp.pptx
@@ -4,6 +4,9 @@
   <p:sldMasterIdLst>
     <p:sldMasterId id="2147483880" r:id="rId1"/>
   </p:sldMasterIdLst>
+  <p:notesMasterIdLst>
+    <p:notesMasterId r:id="rId23"/>
+  </p:notesMasterIdLst>
   <p:sldIdLst>
     <p:sldId id="256" r:id="rId2"/>
     <p:sldId id="257" r:id="rId3"/>
@@ -17,14 +20,15 @@
     <p:sldId id="262" r:id="rId11"/>
     <p:sldId id="276" r:id="rId12"/>
     <p:sldId id="261" r:id="rId13"/>
-    <p:sldId id="259" r:id="rId14"/>
-    <p:sldId id="268" r:id="rId15"/>
-    <p:sldId id="269" r:id="rId16"/>
-    <p:sldId id="270" r:id="rId17"/>
-    <p:sldId id="278" r:id="rId18"/>
-    <p:sldId id="260" r:id="rId19"/>
-    <p:sldId id="277" r:id="rId20"/>
-    <p:sldId id="275" r:id="rId21"/>
+    <p:sldId id="281" r:id="rId14"/>
+    <p:sldId id="259" r:id="rId15"/>
+    <p:sldId id="268" r:id="rId16"/>
+    <p:sldId id="269" r:id="rId17"/>
+    <p:sldId id="270" r:id="rId18"/>
+    <p:sldId id="278" r:id="rId19"/>
+    <p:sldId id="260" r:id="rId20"/>
+    <p:sldId id="277" r:id="rId21"/>
+    <p:sldId id="275" r:id="rId22"/>
   </p:sldIdLst>
   <p:sldSz cx="12192000" cy="6858000"/>
   <p:notesSz cx="6858000" cy="9144000"/>
@@ -131,6 +135,444 @@
 </p:presentation>
 </file>
 
+<file path=ppt/notesMasters/notesMaster1.xml><?xml version="1.0" encoding="utf-8"?>
+<p:notesMaster xmlns:a="http://schemas.openxmlformats.org/drawingml/2006/main" xmlns:r="http://schemas.openxmlformats.org/officeDocument/2006/relationships" xmlns:p="http://schemas.openxmlformats.org/presentationml/2006/main">
+  <p:cSld>
+    <p:bg>
+      <p:bgRef idx="1001">
+        <a:schemeClr val="bg1"/>
+      </p:bgRef>
+    </p:bg>
+    <p:spTree>
+      <p:nvGrpSpPr>
+        <p:cNvPr id="1" name=""/>
+        <p:cNvGrpSpPr/>
+        <p:nvPr/>
+      </p:nvGrpSpPr>
+      <p:grpSpPr>
+        <a:xfrm>
+          <a:off x="0" y="0"/>
+          <a:ext cx="0" cy="0"/>
+          <a:chOff x="0" y="0"/>
+          <a:chExt cx="0" cy="0"/>
+        </a:xfrm>
+      </p:grpSpPr>
+      <p:sp>
+        <p:nvSpPr>
+          <p:cNvPr id="2" name="Header Placeholder 1"/>
+          <p:cNvSpPr>
+            <a:spLocks noGrp="1"/>
+          </p:cNvSpPr>
+          <p:nvPr>
+            <p:ph type="hdr" sz="quarter"/>
+          </p:nvPr>
+        </p:nvSpPr>
+        <p:spPr>
+          <a:xfrm>
+            <a:off x="0" y="0"/>
+            <a:ext cx="2971800" cy="458788"/>
+          </a:xfrm>
+          <a:prstGeom prst="rect">
+            <a:avLst/>
+          </a:prstGeom>
+        </p:spPr>
+        <p:txBody>
+          <a:bodyPr vert="horz" lIns="91440" tIns="45720" rIns="91440" bIns="45720" rtlCol="0"/>
+          <a:lstStyle>
+            <a:lvl1pPr algn="l">
+              <a:defRPr sz="1200"/>
+            </a:lvl1pPr>
+          </a:lstStyle>
+          <a:p>
+            <a:endParaRPr lang="en-US"/>
+          </a:p>
+        </p:txBody>
+      </p:sp>
+      <p:sp>
+        <p:nvSpPr>
+          <p:cNvPr id="3" name="Date Placeholder 2"/>
+          <p:cNvSpPr>
+            <a:spLocks noGrp="1"/>
+          </p:cNvSpPr>
+          <p:nvPr>
+            <p:ph type="dt" idx="1"/>
+          </p:nvPr>
+        </p:nvSpPr>
+        <p:spPr>
+          <a:xfrm>
+            <a:off x="3884613" y="0"/>
+            <a:ext cx="2971800" cy="458788"/>
+          </a:xfrm>
+          <a:prstGeom prst="rect">
+            <a:avLst/>
+          </a:prstGeom>
+        </p:spPr>
+        <p:txBody>
+          <a:bodyPr vert="horz" lIns="91440" tIns="45720" rIns="91440" bIns="45720" rtlCol="0"/>
+          <a:lstStyle>
+            <a:lvl1pPr algn="r">
+              <a:defRPr sz="1200"/>
+            </a:lvl1pPr>
+          </a:lstStyle>
+          <a:p>
+            <a:fld id="{0B513766-384F-40D6-9D17-116E280284C2}" type="datetimeFigureOut">
+              <a:rPr lang="en-US" smtClean="0"/>
+              <a:t>3/17/2015</a:t>
+            </a:fld>
+            <a:endParaRPr lang="en-US"/>
+          </a:p>
+        </p:txBody>
+      </p:sp>
+      <p:sp>
+        <p:nvSpPr>
+          <p:cNvPr id="4" name="Slide Image Placeholder 3"/>
+          <p:cNvSpPr>
+            <a:spLocks noGrp="1" noRot="1" noChangeAspect="1"/>
+          </p:cNvSpPr>
+          <p:nvPr>
+            <p:ph type="sldImg" idx="2"/>
+          </p:nvPr>
+        </p:nvSpPr>
+        <p:spPr>
+          <a:xfrm>
+            <a:off x="685800" y="1143000"/>
+            <a:ext cx="5486400" cy="3086100"/>
+          </a:xfrm>
+          <a:prstGeom prst="rect">
+            <a:avLst/>
+          </a:prstGeom>
+          <a:noFill/>
+          <a:ln w="12700">
+            <a:solidFill>
+              <a:prstClr val="black"/>
+            </a:solidFill>
+          </a:ln>
+        </p:spPr>
+        <p:txBody>
+          <a:bodyPr vert="horz" lIns="91440" tIns="45720" rIns="91440" bIns="45720" rtlCol="0" anchor="ctr"/>
+          <a:lstStyle/>
+          <a:p>
+            <a:endParaRPr lang="en-US"/>
+          </a:p>
+        </p:txBody>
+      </p:sp>
+      <p:sp>
+        <p:nvSpPr>
+          <p:cNvPr id="5" name="Notes Placeholder 4"/>
+          <p:cNvSpPr>
+            <a:spLocks noGrp="1"/>
+          </p:cNvSpPr>
+          <p:nvPr>
+            <p:ph type="body" sz="quarter" idx="3"/>
+          </p:nvPr>
+        </p:nvSpPr>
+        <p:spPr>
+          <a:xfrm>
+            <a:off x="685800" y="4400550"/>
+            <a:ext cx="5486400" cy="3600450"/>
+          </a:xfrm>
+          <a:prstGeom prst="rect">
+            <a:avLst/>
+          </a:prstGeom>
+        </p:spPr>
+        <p:txBody>
+          <a:bodyPr vert="horz" lIns="91440" tIns="45720" rIns="91440" bIns="45720" rtlCol="0"/>
+          <a:lstStyle/>
+          <a:p>
+            <a:pPr lvl="0"/>
+            <a:r>
+              <a:rPr lang="en-US" smtClean="0"/>
+              <a:t>Click to edit Master text styles</a:t>
+            </a:r>
+          </a:p>
+          <a:p>
+            <a:pPr lvl="1"/>
+            <a:r>
+              <a:rPr lang="en-US" smtClean="0"/>
+              <a:t>Second level</a:t>
+            </a:r>
+          </a:p>
+          <a:p>
+            <a:pPr lvl="2"/>
+            <a:r>
+              <a:rPr lang="en-US" smtClean="0"/>
+              <a:t>Third level</a:t>
+            </a:r>
+          </a:p>
+          <a:p>
+            <a:pPr lvl="3"/>
+            <a:r>
+              <a:rPr lang="en-US" smtClean="0"/>
+              <a:t>Fourth level</a:t>
+            </a:r>
+          </a:p>
+          <a:p>
+            <a:pPr lvl="4"/>
+            <a:r>
+              <a:rPr lang="en-US" smtClean="0"/>
+              <a:t>Fifth level</a:t>
+            </a:r>
+            <a:endParaRPr lang="en-US"/>
+          </a:p>
+        </p:txBody>
+      </p:sp>
+      <p:sp>
+        <p:nvSpPr>
+          <p:cNvPr id="6" name="Footer Placeholder 5"/>
+          <p:cNvSpPr>
+            <a:spLocks noGrp="1"/>
+          </p:cNvSpPr>
+          <p:nvPr>
+            <p:ph type="ftr" sz="quarter" idx="4"/>
+          </p:nvPr>
+        </p:nvSpPr>
+        <p:spPr>
+          <a:xfrm>
+            <a:off x="0" y="8685213"/>
+            <a:ext cx="2971800" cy="458787"/>
+          </a:xfrm>
+          <a:prstGeom prst="rect">
+            <a:avLst/>
+          </a:prstGeom>
+        </p:spPr>
+        <p:txBody>
+          <a:bodyPr vert="horz" lIns="91440" tIns="45720" rIns="91440" bIns="45720" rtlCol="0" anchor="b"/>
+          <a:lstStyle>
+            <a:lvl1pPr algn="l">
+              <a:defRPr sz="1200"/>
+            </a:lvl1pPr>
+          </a:lstStyle>
+          <a:p>
+            <a:endParaRPr lang="en-US"/>
+          </a:p>
+        </p:txBody>
+      </p:sp>
+      <p:sp>
+        <p:nvSpPr>
+          <p:cNvPr id="7" name="Slide Number Placeholder 6"/>
+          <p:cNvSpPr>
+            <a:spLocks noGrp="1"/>
+          </p:cNvSpPr>
+          <p:nvPr>
+            <p:ph type="sldNum" sz="quarter" idx="5"/>
+          </p:nvPr>
+        </p:nvSpPr>
+        <p:spPr>
+          <a:xfrm>
+            <a:off x="3884613" y="8685213"/>
+            <a:ext cx="2971800" cy="458787"/>
+          </a:xfrm>
+          <a:prstGeom prst="rect">
+            <a:avLst/>
+          </a:prstGeom>
+        </p:spPr>
+        <p:txBody>
+          <a:bodyPr vert="horz" lIns="91440" tIns="45720" rIns="91440" bIns="45720" rtlCol="0" anchor="b"/>
+          <a:lstStyle>
+            <a:lvl1pPr algn="r">
+              <a:defRPr sz="1200"/>
+            </a:lvl1pPr>
+          </a:lstStyle>
+          <a:p>
+            <a:fld id="{7803CD6F-2C69-408B-94E8-8AA5BDCC632F}" type="slidenum">
+              <a:rPr lang="en-US" smtClean="0"/>
+              <a:t>‹#›</a:t>
+            </a:fld>
+            <a:endParaRPr lang="en-US"/>
+          </a:p>
+        </p:txBody>
+      </p:sp>
+    </p:spTree>
+    <p:extLst>
+      <p:ext uri="{BB962C8B-B14F-4D97-AF65-F5344CB8AC3E}">
+        <p14:creationId xmlns:p14="http://schemas.microsoft.com/office/powerpoint/2010/main" val="113424736"/>
+      </p:ext>
+    </p:extLst>
+  </p:cSld>
+  <p:clrMap bg1="lt1" tx1="dk1" bg2="lt2" tx2="dk2" accent1="accent1" accent2="accent2" accent3="accent3" accent4="accent4" accent5="accent5" accent6="accent6" hlink="hlink" folHlink="folHlink"/>
+  <p:notesStyle>
+    <a:lvl1pPr marL="0" algn="l" defTabSz="914400" rtl="0" eaLnBrk="1" latinLnBrk="0" hangingPunct="1">
+      <a:defRPr sz="1200" kern="1200">
+        <a:solidFill>
+          <a:schemeClr val="tx1"/>
+        </a:solidFill>
+        <a:latin typeface="+mn-lt"/>
+        <a:ea typeface="+mn-ea"/>
+        <a:cs typeface="+mn-cs"/>
+      </a:defRPr>
+    </a:lvl1pPr>
+    <a:lvl2pPr marL="457200" algn="l" defTabSz="914400" rtl="0" eaLnBrk="1" latinLnBrk="0" hangingPunct="1">
+      <a:defRPr sz="1200" kern="1200">
+        <a:solidFill>
+          <a:schemeClr val="tx1"/>
+        </a:solidFill>
+        <a:latin typeface="+mn-lt"/>
+        <a:ea typeface="+mn-ea"/>
+        <a:cs typeface="+mn-cs"/>
+      </a:defRPr>
+    </a:lvl2pPr>
+    <a:lvl3pPr marL="914400" algn="l" defTabSz="914400" rtl="0" eaLnBrk="1" latinLnBrk="0" hangingPunct="1">
+      <a:defRPr sz="1200" kern="1200">
+        <a:solidFill>
+          <a:schemeClr val="tx1"/>
+        </a:solidFill>
+        <a:latin typeface="+mn-lt"/>
+        <a:ea typeface="+mn-ea"/>
+        <a:cs typeface="+mn-cs"/>
+      </a:defRPr>
+    </a:lvl3pPr>
+    <a:lvl4pPr marL="1371600" algn="l" defTabSz="914400" rtl="0" eaLnBrk="1" latinLnBrk="0" hangingPunct="1">
+      <a:defRPr sz="1200" kern="1200">
+        <a:solidFill>
+          <a:schemeClr val="tx1"/>
+        </a:solidFill>
+        <a:latin typeface="+mn-lt"/>
+        <a:ea typeface="+mn-ea"/>
+        <a:cs typeface="+mn-cs"/>
+      </a:defRPr>
+    </a:lvl4pPr>
+    <a:lvl5pPr marL="1828800" algn="l" defTabSz="914400" rtl="0" eaLnBrk="1" latinLnBrk="0" hangingPunct="1">
+      <a:defRPr sz="1200" kern="1200">
+        <a:solidFill>
+          <a:schemeClr val="tx1"/>
+        </a:solidFill>
+        <a:latin typeface="+mn-lt"/>
+        <a:ea typeface="+mn-ea"/>
+        <a:cs typeface="+mn-cs"/>
+      </a:defRPr>
+    </a:lvl5pPr>
+    <a:lvl6pPr marL="2286000" algn="l" defTabSz="914400" rtl="0" eaLnBrk="1" latinLnBrk="0" hangingPunct="1">
+      <a:defRPr sz="1200" kern="1200">
+        <a:solidFill>
+          <a:schemeClr val="tx1"/>
+        </a:solidFill>
+        <a:latin typeface="+mn-lt"/>
+        <a:ea typeface="+mn-ea"/>
+        <a:cs typeface="+mn-cs"/>
+      </a:defRPr>
+    </a:lvl6pPr>
+    <a:lvl7pPr marL="2743200" algn="l" defTabSz="914400" rtl="0" eaLnBrk="1" latinLnBrk="0" hangingPunct="1">
+      <a:defRPr sz="1200" kern="1200">
+        <a:solidFill>
+          <a:schemeClr val="tx1"/>
+        </a:solidFill>
+        <a:latin typeface="+mn-lt"/>
+        <a:ea typeface="+mn-ea"/>
+        <a:cs typeface="+mn-cs"/>
+      </a:defRPr>
+    </a:lvl7pPr>
+    <a:lvl8pPr marL="3200400" algn="l" defTabSz="914400" rtl="0" eaLnBrk="1" latinLnBrk="0" hangingPunct="1">
+      <a:defRPr sz="1200" kern="1200">
+        <a:solidFill>
+          <a:schemeClr val="tx1"/>
+        </a:solidFill>
+        <a:latin typeface="+mn-lt"/>
+        <a:ea typeface="+mn-ea"/>
+        <a:cs typeface="+mn-cs"/>
+      </a:defRPr>
+    </a:lvl8pPr>
+    <a:lvl9pPr marL="3657600" algn="l" defTabSz="914400" rtl="0" eaLnBrk="1" latinLnBrk="0" hangingPunct="1">
+      <a:defRPr sz="1200" kern="1200">
+        <a:solidFill>
+          <a:schemeClr val="tx1"/>
+        </a:solidFill>
+        <a:latin typeface="+mn-lt"/>
+        <a:ea typeface="+mn-ea"/>
+        <a:cs typeface="+mn-cs"/>
+      </a:defRPr>
+    </a:lvl9pPr>
+  </p:notesStyle>
+</p:notesMaster>
+</file>
+
+<file path=ppt/notesSlides/notesSlide1.xml><?xml version="1.0" encoding="utf-8"?>
+<p:notes xmlns:a="http://schemas.openxmlformats.org/drawingml/2006/main" xmlns:r="http://schemas.openxmlformats.org/officeDocument/2006/relationships" xmlns:p="http://schemas.openxmlformats.org/presentationml/2006/main">
+  <p:cSld>
+    <p:spTree>
+      <p:nvGrpSpPr>
+        <p:cNvPr id="1" name=""/>
+        <p:cNvGrpSpPr/>
+        <p:nvPr/>
+      </p:nvGrpSpPr>
+      <p:grpSpPr>
+        <a:xfrm>
+          <a:off x="0" y="0"/>
+          <a:ext cx="0" cy="0"/>
+          <a:chOff x="0" y="0"/>
+          <a:chExt cx="0" cy="0"/>
+        </a:xfrm>
+      </p:grpSpPr>
+      <p:sp>
+        <p:nvSpPr>
+          <p:cNvPr id="2" name="Slide Image Placeholder 1"/>
+          <p:cNvSpPr>
+            <a:spLocks noGrp="1" noRot="1" noChangeAspect="1"/>
+          </p:cNvSpPr>
+          <p:nvPr>
+            <p:ph type="sldImg"/>
+          </p:nvPr>
+        </p:nvSpPr>
+        <p:spPr/>
+      </p:sp>
+      <p:sp>
+        <p:nvSpPr>
+          <p:cNvPr id="3" name="Notes Placeholder 2"/>
+          <p:cNvSpPr>
+            <a:spLocks noGrp="1"/>
+          </p:cNvSpPr>
+          <p:nvPr>
+            <p:ph type="body" idx="1"/>
+          </p:nvPr>
+        </p:nvSpPr>
+        <p:spPr/>
+        <p:txBody>
+          <a:bodyPr/>
+          <a:lstStyle/>
+          <a:p>
+            <a:r>
+              <a:rPr lang="en-US" dirty="0" smtClean="0"/>
+              <a:t>6666666666666666666666666666666666666666666666666666666666666666666666666666666666666666666666666666666666666666666666666666666666666666666</a:t>
+            </a:r>
+            <a:endParaRPr lang="en-US" dirty="0"/>
+          </a:p>
+        </p:txBody>
+      </p:sp>
+      <p:sp>
+        <p:nvSpPr>
+          <p:cNvPr id="4" name="Slide Number Placeholder 3"/>
+          <p:cNvSpPr>
+            <a:spLocks noGrp="1"/>
+          </p:cNvSpPr>
+          <p:nvPr>
+            <p:ph type="sldNum" sz="quarter" idx="10"/>
+          </p:nvPr>
+        </p:nvSpPr>
+        <p:spPr/>
+        <p:txBody>
+          <a:bodyPr/>
+          <a:lstStyle/>
+          <a:p>
+            <a:fld id="{7803CD6F-2C69-408B-94E8-8AA5BDCC632F}" type="slidenum">
+              <a:rPr lang="en-US" smtClean="0"/>
+              <a:t>7</a:t>
+            </a:fld>
+            <a:endParaRPr lang="en-US"/>
+          </a:p>
+        </p:txBody>
+      </p:sp>
+    </p:spTree>
+    <p:extLst>
+      <p:ext uri="{BB962C8B-B14F-4D97-AF65-F5344CB8AC3E}">
+        <p14:creationId xmlns:p14="http://schemas.microsoft.com/office/powerpoint/2010/main" val="3254867525"/>
+      </p:ext>
+    </p:extLst>
+  </p:cSld>
+  <p:clrMapOvr>
+    <a:masterClrMapping/>
+  </p:clrMapOvr>
+</p:notes>
+</file>
+
 <file path=ppt/slideLayouts/slideLayout1.xml><?xml version="1.0" encoding="utf-8"?>
 <p:sldLayout xmlns:a="http://schemas.openxmlformats.org/drawingml/2006/main" xmlns:r="http://schemas.openxmlformats.org/officeDocument/2006/relationships" xmlns:p="http://schemas.openxmlformats.org/presentationml/2006/main" type="title" preserve="1">
   <p:cSld name="Title Slide">
@@ -319,7 +761,7 @@
           <a:p>
             <a:fld id="{EF219E1B-4890-4F49-91E8-D72D40D18256}" type="datetimeFigureOut">
               <a:rPr lang="en-US" smtClean="0"/>
-              <a:t>2/26/2015</a:t>
+              <a:t>3/17/2015</a:t>
             </a:fld>
             <a:endParaRPr lang="en-US"/>
           </a:p>
@@ -657,7 +1099,7 @@
           <a:p>
             <a:fld id="{EF219E1B-4890-4F49-91E8-D72D40D18256}" type="datetimeFigureOut">
               <a:rPr lang="en-US" smtClean="0"/>
-              <a:t>2/26/2015</a:t>
+              <a:t>3/17/2015</a:t>
             </a:fld>
             <a:endParaRPr lang="en-US"/>
           </a:p>
@@ -1058,7 +1500,7 @@
           <a:p>
             <a:fld id="{EF219E1B-4890-4F49-91E8-D72D40D18256}" type="datetimeFigureOut">
               <a:rPr lang="en-US" smtClean="0"/>
-              <a:t>2/26/2015</a:t>
+              <a:t>3/17/2015</a:t>
             </a:fld>
             <a:endParaRPr lang="en-US"/>
           </a:p>
@@ -1394,7 +1836,7 @@
           <a:p>
             <a:fld id="{EF219E1B-4890-4F49-91E8-D72D40D18256}" type="datetimeFigureOut">
               <a:rPr lang="en-US" smtClean="0"/>
-              <a:t>2/26/2015</a:t>
+              <a:t>3/17/2015</a:t>
             </a:fld>
             <a:endParaRPr lang="en-US"/>
           </a:p>
@@ -1714,7 +2156,7 @@
           <a:p>
             <a:fld id="{EF219E1B-4890-4F49-91E8-D72D40D18256}" type="datetimeFigureOut">
               <a:rPr lang="en-US" smtClean="0"/>
-              <a:t>2/26/2015</a:t>
+              <a:t>3/17/2015</a:t>
             </a:fld>
             <a:endParaRPr lang="en-US"/>
           </a:p>
@@ -2110,7 +2552,7 @@
           <a:p>
             <a:fld id="{EF219E1B-4890-4F49-91E8-D72D40D18256}" type="datetimeFigureOut">
               <a:rPr lang="en-US" smtClean="0"/>
-              <a:t>2/26/2015</a:t>
+              <a:t>3/17/2015</a:t>
             </a:fld>
             <a:endParaRPr lang="en-US"/>
           </a:p>
@@ -2367,7 +2809,7 @@
           <a:p>
             <a:fld id="{EF219E1B-4890-4F49-91E8-D72D40D18256}" type="datetimeFigureOut">
               <a:rPr lang="en-US" smtClean="0"/>
-              <a:t>2/26/2015</a:t>
+              <a:t>3/17/2015</a:t>
             </a:fld>
             <a:endParaRPr lang="en-US"/>
           </a:p>
@@ -2629,7 +3071,7 @@
           <a:p>
             <a:fld id="{EF219E1B-4890-4F49-91E8-D72D40D18256}" type="datetimeFigureOut">
               <a:rPr lang="en-US" smtClean="0"/>
-              <a:t>2/26/2015</a:t>
+              <a:t>3/17/2015</a:t>
             </a:fld>
             <a:endParaRPr lang="en-US"/>
           </a:p>
@@ -2891,7 +3333,7 @@
           <a:p>
             <a:fld id="{EF219E1B-4890-4F49-91E8-D72D40D18256}" type="datetimeFigureOut">
               <a:rPr lang="en-US" smtClean="0"/>
-              <a:t>2/26/2015</a:t>
+              <a:t>3/17/2015</a:t>
             </a:fld>
             <a:endParaRPr lang="en-US"/>
           </a:p>
@@ -3220,7 +3662,7 @@
           <a:p>
             <a:fld id="{EF219E1B-4890-4F49-91E8-D72D40D18256}" type="datetimeFigureOut">
               <a:rPr lang="en-US" smtClean="0"/>
-              <a:t>2/26/2015</a:t>
+              <a:t>3/17/2015</a:t>
             </a:fld>
             <a:endParaRPr lang="en-US"/>
           </a:p>
@@ -3543,7 +3985,7 @@
           <a:p>
             <a:fld id="{EF219E1B-4890-4F49-91E8-D72D40D18256}" type="datetimeFigureOut">
               <a:rPr lang="en-US" smtClean="0"/>
-              <a:t>2/26/2015</a:t>
+              <a:t>3/17/2015</a:t>
             </a:fld>
             <a:endParaRPr lang="en-US"/>
           </a:p>
@@ -4000,7 +4442,7 @@
           <a:p>
             <a:fld id="{EF219E1B-4890-4F49-91E8-D72D40D18256}" type="datetimeFigureOut">
               <a:rPr lang="en-US" smtClean="0"/>
-              <a:t>2/26/2015</a:t>
+              <a:t>3/17/2015</a:t>
             </a:fld>
             <a:endParaRPr lang="en-US"/>
           </a:p>
@@ -4205,7 +4647,7 @@
           <a:p>
             <a:fld id="{EF219E1B-4890-4F49-91E8-D72D40D18256}" type="datetimeFigureOut">
               <a:rPr lang="en-US" smtClean="0"/>
-              <a:t>2/26/2015</a:t>
+              <a:t>3/17/2015</a:t>
             </a:fld>
             <a:endParaRPr lang="en-US"/>
           </a:p>
@@ -4382,7 +4824,7 @@
           <a:p>
             <a:fld id="{EF219E1B-4890-4F49-91E8-D72D40D18256}" type="datetimeFigureOut">
               <a:rPr lang="en-US" smtClean="0"/>
-              <a:t>2/26/2015</a:t>
+              <a:t>3/17/2015</a:t>
             </a:fld>
             <a:endParaRPr lang="en-US"/>
           </a:p>
@@ -4715,7 +5157,7 @@
           <a:p>
             <a:fld id="{EF219E1B-4890-4F49-91E8-D72D40D18256}" type="datetimeFigureOut">
               <a:rPr lang="en-US" smtClean="0"/>
-              <a:t>2/26/2015</a:t>
+              <a:t>3/17/2015</a:t>
             </a:fld>
             <a:endParaRPr lang="en-US"/>
           </a:p>
@@ -5060,7 +5502,7 @@
           <a:p>
             <a:fld id="{EF219E1B-4890-4F49-91E8-D72D40D18256}" type="datetimeFigureOut">
               <a:rPr lang="en-US" smtClean="0"/>
-              <a:t>2/26/2015</a:t>
+              <a:t>3/17/2015</a:t>
             </a:fld>
             <a:endParaRPr lang="en-US"/>
           </a:p>
@@ -7177,7 +7619,7 @@
           <a:p>
             <a:fld id="{EF219E1B-4890-4F49-91E8-D72D40D18256}" type="datetimeFigureOut">
               <a:rPr lang="en-US" smtClean="0"/>
-              <a:t>2/26/2015</a:t>
+              <a:t>3/17/2015</a:t>
             </a:fld>
             <a:endParaRPr lang="en-US"/>
           </a:p>
@@ -7827,11 +8269,7 @@
           <a:p>
             <a:r>
               <a:rPr lang="en-US" dirty="0" smtClean="0"/>
-              <a:t>Entire expression evaluates to </a:t>
-            </a:r>
-            <a:r>
-              <a:rPr lang="en-US" dirty="0" smtClean="0"/>
-              <a:t>null</a:t>
+              <a:t>Entire expression evaluates to null</a:t>
             </a:r>
           </a:p>
           <a:p>
@@ -8028,11 +8466,7 @@
           <a:p>
             <a:r>
               <a:rPr lang="en-US" dirty="0" smtClean="0"/>
-              <a:t>Prevents mistyping </a:t>
-            </a:r>
-            <a:r>
-              <a:rPr lang="en-US" dirty="0" smtClean="0"/>
-              <a:t>strings</a:t>
+              <a:t>Prevents mistyping strings</a:t>
             </a:r>
           </a:p>
           <a:p>
@@ -8182,22 +8616,13 @@
           <a:p>
             <a:r>
               <a:rPr lang="en-US" dirty="0" smtClean="0"/>
-              <a:t>Fine grained checks for handling </a:t>
-            </a:r>
+              <a:t>Fine grained checks for handling exceptions</a:t>
+            </a:r>
+          </a:p>
+          <a:p>
             <a:r>
               <a:rPr lang="en-US" dirty="0" smtClean="0"/>
-              <a:t>exceptions</a:t>
-            </a:r>
-            <a:endParaRPr lang="en-US" dirty="0" smtClean="0"/>
-          </a:p>
-          <a:p>
-            <a:r>
-              <a:rPr lang="en-US" dirty="0" smtClean="0"/>
-              <a:t>Easier to </a:t>
-            </a:r>
-            <a:r>
-              <a:rPr lang="en-US" dirty="0" smtClean="0"/>
-              <a:t>debug</a:t>
+              <a:t>Easier to debug</a:t>
             </a:r>
           </a:p>
           <a:p>
@@ -9093,6 +9518,933 @@
           <a:lstStyle/>
           <a:p>
             <a:r>
+              <a:rPr lang="en-US" dirty="0" err="1" smtClean="0"/>
+              <a:t>Async</a:t>
+            </a:r>
+            <a:r>
+              <a:rPr lang="en-US" dirty="0" smtClean="0"/>
+              <a:t> Enhancements</a:t>
+            </a:r>
+            <a:endParaRPr lang="en-US" dirty="0"/>
+          </a:p>
+        </p:txBody>
+      </p:sp>
+      <p:sp>
+        <p:nvSpPr>
+          <p:cNvPr id="3" name="Content Placeholder 2"/>
+          <p:cNvSpPr>
+            <a:spLocks noGrp="1"/>
+          </p:cNvSpPr>
+          <p:nvPr>
+            <p:ph idx="1"/>
+          </p:nvPr>
+        </p:nvSpPr>
+        <p:spPr>
+          <a:xfrm>
+            <a:off x="2589212" y="1533379"/>
+            <a:ext cx="8915400" cy="5176910"/>
+          </a:xfrm>
+        </p:spPr>
+        <p:txBody>
+          <a:bodyPr>
+            <a:normAutofit fontScale="92500" lnSpcReduction="10000"/>
+          </a:bodyPr>
+          <a:lstStyle/>
+          <a:p>
+            <a:r>
+              <a:rPr lang="en-US" dirty="0" err="1" smtClean="0"/>
+              <a:t>Async</a:t>
+            </a:r>
+            <a:r>
+              <a:rPr lang="en-US" dirty="0" smtClean="0"/>
+              <a:t> in catch and finally</a:t>
+            </a:r>
+          </a:p>
+          <a:p>
+            <a:pPr marL="0" indent="0">
+              <a:buNone/>
+            </a:pPr>
+            <a:r>
+              <a:rPr lang="en-US" dirty="0" smtClean="0">
+                <a:solidFill>
+                  <a:srgbClr val="0000FF"/>
+                </a:solidFill>
+                <a:highlight>
+                  <a:srgbClr val="FFFFFF"/>
+                </a:highlight>
+                <a:latin typeface="Consolas" panose="020B0609020204030204" pitchFamily="49" charset="0"/>
+              </a:rPr>
+              <a:t>       try</a:t>
+            </a:r>
+            <a:endParaRPr lang="en-US" dirty="0">
+              <a:solidFill>
+                <a:srgbClr val="000000"/>
+              </a:solidFill>
+              <a:highlight>
+                <a:srgbClr val="FFFFFF"/>
+              </a:highlight>
+              <a:latin typeface="Consolas" panose="020B0609020204030204" pitchFamily="49" charset="0"/>
+            </a:endParaRPr>
+          </a:p>
+          <a:p>
+            <a:pPr marL="0" indent="0">
+              <a:buNone/>
+            </a:pPr>
+            <a:r>
+              <a:rPr lang="en-US" dirty="0" smtClean="0">
+                <a:solidFill>
+                  <a:srgbClr val="000000"/>
+                </a:solidFill>
+                <a:highlight>
+                  <a:srgbClr val="FFFFFF"/>
+                </a:highlight>
+                <a:latin typeface="Consolas" panose="020B0609020204030204" pitchFamily="49" charset="0"/>
+              </a:rPr>
+              <a:t>       </a:t>
+            </a:r>
+            <a:r>
+              <a:rPr lang="en-US" dirty="0">
+                <a:solidFill>
+                  <a:srgbClr val="000000"/>
+                </a:solidFill>
+                <a:highlight>
+                  <a:srgbClr val="FFFFFF"/>
+                </a:highlight>
+                <a:latin typeface="Consolas" panose="020B0609020204030204" pitchFamily="49" charset="0"/>
+              </a:rPr>
+              <a:t>{</a:t>
+            </a:r>
+          </a:p>
+          <a:p>
+            <a:pPr marL="0" indent="0">
+              <a:buNone/>
+            </a:pPr>
+            <a:r>
+              <a:rPr lang="en-US" dirty="0">
+                <a:solidFill>
+                  <a:srgbClr val="000000"/>
+                </a:solidFill>
+                <a:highlight>
+                  <a:srgbClr val="FFFFFF"/>
+                </a:highlight>
+                <a:latin typeface="Consolas" panose="020B0609020204030204" pitchFamily="49" charset="0"/>
+              </a:rPr>
+              <a:t>       </a:t>
+            </a:r>
+            <a:r>
+              <a:rPr lang="en-US" dirty="0" smtClean="0">
+                <a:solidFill>
+                  <a:srgbClr val="000000"/>
+                </a:solidFill>
+                <a:highlight>
+                  <a:srgbClr val="FFFFFF"/>
+                </a:highlight>
+                <a:latin typeface="Consolas" panose="020B0609020204030204" pitchFamily="49" charset="0"/>
+              </a:rPr>
+              <a:t>    </a:t>
+            </a:r>
+            <a:r>
+              <a:rPr lang="en-US" dirty="0">
+                <a:solidFill>
+                  <a:srgbClr val="0000FF"/>
+                </a:solidFill>
+                <a:highlight>
+                  <a:srgbClr val="FFFFFF"/>
+                </a:highlight>
+                <a:latin typeface="Consolas" panose="020B0609020204030204" pitchFamily="49" charset="0"/>
+              </a:rPr>
+              <a:t>await</a:t>
+            </a:r>
+            <a:r>
+              <a:rPr lang="en-US" dirty="0">
+                <a:solidFill>
+                  <a:srgbClr val="000000"/>
+                </a:solidFill>
+                <a:highlight>
+                  <a:srgbClr val="FFFFFF"/>
+                </a:highlight>
+                <a:latin typeface="Consolas" panose="020B0609020204030204" pitchFamily="49" charset="0"/>
+              </a:rPr>
+              <a:t> </a:t>
+            </a:r>
+            <a:r>
+              <a:rPr lang="en-US" dirty="0" err="1">
+                <a:solidFill>
+                  <a:srgbClr val="2B91AF"/>
+                </a:solidFill>
+                <a:highlight>
+                  <a:srgbClr val="FFFFFF"/>
+                </a:highlight>
+                <a:latin typeface="Consolas" panose="020B0609020204030204" pitchFamily="49" charset="0"/>
+              </a:rPr>
+              <a:t>Program</a:t>
+            </a:r>
+            <a:r>
+              <a:rPr lang="en-US" dirty="0" err="1">
+                <a:solidFill>
+                  <a:srgbClr val="000000"/>
+                </a:solidFill>
+                <a:highlight>
+                  <a:srgbClr val="FFFFFF"/>
+                </a:highlight>
+                <a:latin typeface="Consolas" panose="020B0609020204030204" pitchFamily="49" charset="0"/>
+              </a:rPr>
+              <a:t>.Log</a:t>
+            </a:r>
+            <a:r>
+              <a:rPr lang="en-US" dirty="0">
+                <a:solidFill>
+                  <a:srgbClr val="000000"/>
+                </a:solidFill>
+                <a:highlight>
+                  <a:srgbClr val="FFFFFF"/>
+                </a:highlight>
+                <a:latin typeface="Consolas" panose="020B0609020204030204" pitchFamily="49" charset="0"/>
+              </a:rPr>
+              <a:t>(</a:t>
+            </a:r>
+            <a:r>
+              <a:rPr lang="en-US" dirty="0">
+                <a:solidFill>
+                  <a:srgbClr val="A31515"/>
+                </a:solidFill>
+                <a:highlight>
+                  <a:srgbClr val="FFFFFF"/>
+                </a:highlight>
+                <a:latin typeface="Consolas" panose="020B0609020204030204" pitchFamily="49" charset="0"/>
+              </a:rPr>
+              <a:t>"In Try</a:t>
+            </a:r>
+            <a:r>
+              <a:rPr lang="en-US" dirty="0" smtClean="0">
+                <a:solidFill>
+                  <a:srgbClr val="A31515"/>
+                </a:solidFill>
+                <a:highlight>
+                  <a:srgbClr val="FFFFFF"/>
+                </a:highlight>
+                <a:latin typeface="Consolas" panose="020B0609020204030204" pitchFamily="49" charset="0"/>
+              </a:rPr>
+              <a:t>"</a:t>
+            </a:r>
+            <a:r>
+              <a:rPr lang="en-US" dirty="0" smtClean="0">
+                <a:solidFill>
+                  <a:srgbClr val="000000"/>
+                </a:solidFill>
+                <a:highlight>
+                  <a:srgbClr val="FFFFFF"/>
+                </a:highlight>
+                <a:latin typeface="Consolas" panose="020B0609020204030204" pitchFamily="49" charset="0"/>
+              </a:rPr>
+              <a:t>);</a:t>
+            </a:r>
+            <a:endParaRPr lang="en-US" dirty="0">
+              <a:solidFill>
+                <a:srgbClr val="000000"/>
+              </a:solidFill>
+              <a:highlight>
+                <a:srgbClr val="FFFFFF"/>
+              </a:highlight>
+              <a:latin typeface="Consolas" panose="020B0609020204030204" pitchFamily="49" charset="0"/>
+            </a:endParaRPr>
+          </a:p>
+          <a:p>
+            <a:pPr marL="0" indent="0">
+              <a:buNone/>
+            </a:pPr>
+            <a:r>
+              <a:rPr lang="en-US" dirty="0">
+                <a:solidFill>
+                  <a:srgbClr val="000000"/>
+                </a:solidFill>
+                <a:highlight>
+                  <a:srgbClr val="FFFFFF"/>
+                </a:highlight>
+                <a:latin typeface="Consolas" panose="020B0609020204030204" pitchFamily="49" charset="0"/>
+              </a:rPr>
+              <a:t>       </a:t>
+            </a:r>
+            <a:r>
+              <a:rPr lang="en-US" dirty="0" smtClean="0">
+                <a:solidFill>
+                  <a:srgbClr val="000000"/>
+                </a:solidFill>
+                <a:highlight>
+                  <a:srgbClr val="FFFFFF"/>
+                </a:highlight>
+                <a:latin typeface="Consolas" panose="020B0609020204030204" pitchFamily="49" charset="0"/>
+              </a:rPr>
+              <a:t>    </a:t>
+            </a:r>
+            <a:r>
+              <a:rPr lang="en-US" dirty="0">
+                <a:solidFill>
+                  <a:srgbClr val="0000FF"/>
+                </a:solidFill>
+                <a:highlight>
+                  <a:srgbClr val="FFFFFF"/>
+                </a:highlight>
+                <a:latin typeface="Consolas" panose="020B0609020204030204" pitchFamily="49" charset="0"/>
+              </a:rPr>
+              <a:t>throw</a:t>
+            </a:r>
+            <a:r>
+              <a:rPr lang="en-US" dirty="0">
+                <a:solidFill>
+                  <a:srgbClr val="000000"/>
+                </a:solidFill>
+                <a:highlight>
+                  <a:srgbClr val="FFFFFF"/>
+                </a:highlight>
+                <a:latin typeface="Consolas" panose="020B0609020204030204" pitchFamily="49" charset="0"/>
+              </a:rPr>
+              <a:t> </a:t>
+            </a:r>
+            <a:r>
+              <a:rPr lang="en-US" dirty="0">
+                <a:solidFill>
+                  <a:srgbClr val="0000FF"/>
+                </a:solidFill>
+                <a:highlight>
+                  <a:srgbClr val="FFFFFF"/>
+                </a:highlight>
+                <a:latin typeface="Consolas" panose="020B0609020204030204" pitchFamily="49" charset="0"/>
+              </a:rPr>
+              <a:t>new</a:t>
+            </a:r>
+            <a:r>
+              <a:rPr lang="en-US" dirty="0">
+                <a:solidFill>
+                  <a:srgbClr val="000000"/>
+                </a:solidFill>
+                <a:highlight>
+                  <a:srgbClr val="FFFFFF"/>
+                </a:highlight>
+                <a:latin typeface="Consolas" panose="020B0609020204030204" pitchFamily="49" charset="0"/>
+              </a:rPr>
+              <a:t> </a:t>
+            </a:r>
+            <a:r>
+              <a:rPr lang="en-US" dirty="0">
+                <a:solidFill>
+                  <a:srgbClr val="2B91AF"/>
+                </a:solidFill>
+                <a:highlight>
+                  <a:srgbClr val="FFFFFF"/>
+                </a:highlight>
+                <a:latin typeface="Consolas" panose="020B0609020204030204" pitchFamily="49" charset="0"/>
+              </a:rPr>
+              <a:t>Exception</a:t>
+            </a:r>
+            <a:r>
+              <a:rPr lang="en-US" dirty="0">
+                <a:solidFill>
+                  <a:srgbClr val="000000"/>
+                </a:solidFill>
+                <a:highlight>
+                  <a:srgbClr val="FFFFFF"/>
+                </a:highlight>
+                <a:latin typeface="Consolas" panose="020B0609020204030204" pitchFamily="49" charset="0"/>
+              </a:rPr>
+              <a:t>(</a:t>
+            </a:r>
+            <a:r>
+              <a:rPr lang="en-US" dirty="0">
+                <a:solidFill>
+                  <a:srgbClr val="A31515"/>
+                </a:solidFill>
+                <a:highlight>
+                  <a:srgbClr val="FFFFFF"/>
+                </a:highlight>
+                <a:latin typeface="Consolas" panose="020B0609020204030204" pitchFamily="49" charset="0"/>
+              </a:rPr>
+              <a:t>"Threw Exception"</a:t>
+            </a:r>
+            <a:r>
+              <a:rPr lang="en-US" dirty="0">
+                <a:solidFill>
+                  <a:srgbClr val="000000"/>
+                </a:solidFill>
+                <a:highlight>
+                  <a:srgbClr val="FFFFFF"/>
+                </a:highlight>
+                <a:latin typeface="Consolas" panose="020B0609020204030204" pitchFamily="49" charset="0"/>
+              </a:rPr>
+              <a:t>);</a:t>
+            </a:r>
+          </a:p>
+          <a:p>
+            <a:pPr marL="0" indent="0">
+              <a:buNone/>
+            </a:pPr>
+            <a:r>
+              <a:rPr lang="en-US" dirty="0">
+                <a:solidFill>
+                  <a:srgbClr val="000000"/>
+                </a:solidFill>
+                <a:highlight>
+                  <a:srgbClr val="FFFFFF"/>
+                </a:highlight>
+                <a:latin typeface="Consolas" panose="020B0609020204030204" pitchFamily="49" charset="0"/>
+              </a:rPr>
+              <a:t>       </a:t>
+            </a:r>
+            <a:r>
+              <a:rPr lang="en-US" dirty="0" smtClean="0">
+                <a:solidFill>
+                  <a:srgbClr val="000000"/>
+                </a:solidFill>
+                <a:highlight>
+                  <a:srgbClr val="FFFFFF"/>
+                </a:highlight>
+                <a:latin typeface="Consolas" panose="020B0609020204030204" pitchFamily="49" charset="0"/>
+              </a:rPr>
+              <a:t>}</a:t>
+            </a:r>
+            <a:endParaRPr lang="en-US" dirty="0">
+              <a:solidFill>
+                <a:srgbClr val="000000"/>
+              </a:solidFill>
+              <a:highlight>
+                <a:srgbClr val="FFFFFF"/>
+              </a:highlight>
+              <a:latin typeface="Consolas" panose="020B0609020204030204" pitchFamily="49" charset="0"/>
+            </a:endParaRPr>
+          </a:p>
+          <a:p>
+            <a:pPr marL="0" indent="0">
+              <a:buNone/>
+            </a:pPr>
+            <a:r>
+              <a:rPr lang="en-US" dirty="0">
+                <a:solidFill>
+                  <a:srgbClr val="000000"/>
+                </a:solidFill>
+                <a:highlight>
+                  <a:srgbClr val="FFFFFF"/>
+                </a:highlight>
+                <a:latin typeface="Consolas" panose="020B0609020204030204" pitchFamily="49" charset="0"/>
+              </a:rPr>
+              <a:t>       </a:t>
+            </a:r>
+            <a:r>
+              <a:rPr lang="en-US" dirty="0" smtClean="0">
+                <a:solidFill>
+                  <a:srgbClr val="0000FF"/>
+                </a:solidFill>
+                <a:highlight>
+                  <a:srgbClr val="FFFFFF"/>
+                </a:highlight>
+                <a:latin typeface="Consolas" panose="020B0609020204030204" pitchFamily="49" charset="0"/>
+              </a:rPr>
+              <a:t>catch</a:t>
+            </a:r>
+            <a:r>
+              <a:rPr lang="en-US" dirty="0" smtClean="0">
+                <a:solidFill>
+                  <a:srgbClr val="000000"/>
+                </a:solidFill>
+                <a:highlight>
+                  <a:srgbClr val="FFFFFF"/>
+                </a:highlight>
+                <a:latin typeface="Consolas" panose="020B0609020204030204" pitchFamily="49" charset="0"/>
+              </a:rPr>
+              <a:t> </a:t>
+            </a:r>
+            <a:r>
+              <a:rPr lang="en-US" dirty="0">
+                <a:solidFill>
+                  <a:srgbClr val="000000"/>
+                </a:solidFill>
+                <a:highlight>
+                  <a:srgbClr val="FFFFFF"/>
+                </a:highlight>
+                <a:latin typeface="Consolas" panose="020B0609020204030204" pitchFamily="49" charset="0"/>
+              </a:rPr>
+              <a:t>(</a:t>
+            </a:r>
+            <a:r>
+              <a:rPr lang="en-US" dirty="0">
+                <a:solidFill>
+                  <a:srgbClr val="2B91AF"/>
+                </a:solidFill>
+                <a:highlight>
+                  <a:srgbClr val="FFFFFF"/>
+                </a:highlight>
+                <a:latin typeface="Consolas" panose="020B0609020204030204" pitchFamily="49" charset="0"/>
+              </a:rPr>
+              <a:t>Exception</a:t>
+            </a:r>
+            <a:r>
+              <a:rPr lang="en-US" dirty="0">
+                <a:solidFill>
+                  <a:srgbClr val="000000"/>
+                </a:solidFill>
+                <a:highlight>
+                  <a:srgbClr val="FFFFFF"/>
+                </a:highlight>
+                <a:latin typeface="Consolas" panose="020B0609020204030204" pitchFamily="49" charset="0"/>
+              </a:rPr>
+              <a:t> ex)</a:t>
+            </a:r>
+          </a:p>
+          <a:p>
+            <a:pPr marL="0" indent="0">
+              <a:buNone/>
+            </a:pPr>
+            <a:r>
+              <a:rPr lang="en-US" dirty="0">
+                <a:solidFill>
+                  <a:srgbClr val="000000"/>
+                </a:solidFill>
+                <a:highlight>
+                  <a:srgbClr val="FFFFFF"/>
+                </a:highlight>
+                <a:latin typeface="Consolas" panose="020B0609020204030204" pitchFamily="49" charset="0"/>
+              </a:rPr>
+              <a:t>       </a:t>
+            </a:r>
+            <a:r>
+              <a:rPr lang="en-US" dirty="0" smtClean="0">
+                <a:solidFill>
+                  <a:srgbClr val="000000"/>
+                </a:solidFill>
+                <a:highlight>
+                  <a:srgbClr val="FFFFFF"/>
+                </a:highlight>
+                <a:latin typeface="Consolas" panose="020B0609020204030204" pitchFamily="49" charset="0"/>
+              </a:rPr>
+              <a:t>{</a:t>
+            </a:r>
+            <a:endParaRPr lang="en-US" dirty="0">
+              <a:solidFill>
+                <a:srgbClr val="000000"/>
+              </a:solidFill>
+              <a:highlight>
+                <a:srgbClr val="FFFFFF"/>
+              </a:highlight>
+              <a:latin typeface="Consolas" panose="020B0609020204030204" pitchFamily="49" charset="0"/>
+            </a:endParaRPr>
+          </a:p>
+          <a:p>
+            <a:pPr marL="0" indent="0">
+              <a:buNone/>
+            </a:pPr>
+            <a:r>
+              <a:rPr lang="en-US" dirty="0">
+                <a:solidFill>
+                  <a:srgbClr val="000000"/>
+                </a:solidFill>
+                <a:highlight>
+                  <a:srgbClr val="FFFFFF"/>
+                </a:highlight>
+                <a:latin typeface="Consolas" panose="020B0609020204030204" pitchFamily="49" charset="0"/>
+              </a:rPr>
+              <a:t>       </a:t>
+            </a:r>
+            <a:r>
+              <a:rPr lang="en-US" dirty="0" smtClean="0">
+                <a:solidFill>
+                  <a:srgbClr val="000000"/>
+                </a:solidFill>
+                <a:highlight>
+                  <a:srgbClr val="FFFFFF"/>
+                </a:highlight>
+                <a:latin typeface="Consolas" panose="020B0609020204030204" pitchFamily="49" charset="0"/>
+              </a:rPr>
+              <a:t>    </a:t>
+            </a:r>
+            <a:r>
+              <a:rPr lang="en-US" dirty="0">
+                <a:solidFill>
+                  <a:srgbClr val="0000FF"/>
+                </a:solidFill>
+                <a:highlight>
+                  <a:srgbClr val="FFFFFF"/>
+                </a:highlight>
+                <a:latin typeface="Consolas" panose="020B0609020204030204" pitchFamily="49" charset="0"/>
+              </a:rPr>
+              <a:t>await</a:t>
+            </a:r>
+            <a:r>
+              <a:rPr lang="en-US" dirty="0">
+                <a:solidFill>
+                  <a:srgbClr val="000000"/>
+                </a:solidFill>
+                <a:highlight>
+                  <a:srgbClr val="FFFFFF"/>
+                </a:highlight>
+                <a:latin typeface="Consolas" panose="020B0609020204030204" pitchFamily="49" charset="0"/>
+              </a:rPr>
+              <a:t> </a:t>
+            </a:r>
+            <a:r>
+              <a:rPr lang="en-US" dirty="0" err="1">
+                <a:solidFill>
+                  <a:srgbClr val="2B91AF"/>
+                </a:solidFill>
+                <a:highlight>
+                  <a:srgbClr val="FFFFFF"/>
+                </a:highlight>
+                <a:latin typeface="Consolas" panose="020B0609020204030204" pitchFamily="49" charset="0"/>
+              </a:rPr>
+              <a:t>Program</a:t>
+            </a:r>
+            <a:r>
+              <a:rPr lang="en-US" dirty="0" err="1">
+                <a:solidFill>
+                  <a:srgbClr val="000000"/>
+                </a:solidFill>
+                <a:highlight>
+                  <a:srgbClr val="FFFFFF"/>
+                </a:highlight>
+                <a:latin typeface="Consolas" panose="020B0609020204030204" pitchFamily="49" charset="0"/>
+              </a:rPr>
+              <a:t>.Log</a:t>
+            </a:r>
+            <a:r>
+              <a:rPr lang="en-US" dirty="0">
+                <a:solidFill>
+                  <a:srgbClr val="000000"/>
+                </a:solidFill>
+                <a:highlight>
+                  <a:srgbClr val="FFFFFF"/>
+                </a:highlight>
+                <a:latin typeface="Consolas" panose="020B0609020204030204" pitchFamily="49" charset="0"/>
+              </a:rPr>
+              <a:t>(</a:t>
+            </a:r>
+            <a:r>
+              <a:rPr lang="en-US" dirty="0" err="1">
+                <a:solidFill>
+                  <a:srgbClr val="000000"/>
+                </a:solidFill>
+                <a:highlight>
+                  <a:srgbClr val="FFFFFF"/>
+                </a:highlight>
+                <a:latin typeface="Consolas" panose="020B0609020204030204" pitchFamily="49" charset="0"/>
+              </a:rPr>
+              <a:t>ex.Message</a:t>
+            </a:r>
+            <a:r>
+              <a:rPr lang="en-US" dirty="0">
+                <a:solidFill>
+                  <a:srgbClr val="000000"/>
+                </a:solidFill>
+                <a:highlight>
+                  <a:srgbClr val="FFFFFF"/>
+                </a:highlight>
+                <a:latin typeface="Consolas" panose="020B0609020204030204" pitchFamily="49" charset="0"/>
+              </a:rPr>
+              <a:t>);</a:t>
+            </a:r>
+          </a:p>
+          <a:p>
+            <a:pPr marL="0" indent="0">
+              <a:buNone/>
+            </a:pPr>
+            <a:r>
+              <a:rPr lang="en-US" dirty="0">
+                <a:solidFill>
+                  <a:srgbClr val="000000"/>
+                </a:solidFill>
+                <a:highlight>
+                  <a:srgbClr val="FFFFFF"/>
+                </a:highlight>
+                <a:latin typeface="Consolas" panose="020B0609020204030204" pitchFamily="49" charset="0"/>
+              </a:rPr>
+              <a:t>       </a:t>
+            </a:r>
+            <a:r>
+              <a:rPr lang="en-US" dirty="0" smtClean="0">
+                <a:solidFill>
+                  <a:srgbClr val="000000"/>
+                </a:solidFill>
+                <a:highlight>
+                  <a:srgbClr val="FFFFFF"/>
+                </a:highlight>
+                <a:latin typeface="Consolas" panose="020B0609020204030204" pitchFamily="49" charset="0"/>
+              </a:rPr>
+              <a:t>}</a:t>
+            </a:r>
+            <a:endParaRPr lang="en-US" dirty="0">
+              <a:solidFill>
+                <a:srgbClr val="000000"/>
+              </a:solidFill>
+              <a:highlight>
+                <a:srgbClr val="FFFFFF"/>
+              </a:highlight>
+              <a:latin typeface="Consolas" panose="020B0609020204030204" pitchFamily="49" charset="0"/>
+            </a:endParaRPr>
+          </a:p>
+          <a:p>
+            <a:pPr marL="0" indent="0">
+              <a:buNone/>
+            </a:pPr>
+            <a:r>
+              <a:rPr lang="en-US" dirty="0">
+                <a:solidFill>
+                  <a:srgbClr val="000000"/>
+                </a:solidFill>
+                <a:highlight>
+                  <a:srgbClr val="FFFFFF"/>
+                </a:highlight>
+                <a:latin typeface="Consolas" panose="020B0609020204030204" pitchFamily="49" charset="0"/>
+              </a:rPr>
+              <a:t>       </a:t>
+            </a:r>
+            <a:r>
+              <a:rPr lang="en-US" dirty="0" smtClean="0">
+                <a:solidFill>
+                  <a:srgbClr val="0000FF"/>
+                </a:solidFill>
+                <a:highlight>
+                  <a:srgbClr val="FFFFFF"/>
+                </a:highlight>
+                <a:latin typeface="Consolas" panose="020B0609020204030204" pitchFamily="49" charset="0"/>
+              </a:rPr>
+              <a:t>finally</a:t>
+            </a:r>
+            <a:endParaRPr lang="en-US" dirty="0">
+              <a:solidFill>
+                <a:srgbClr val="000000"/>
+              </a:solidFill>
+              <a:highlight>
+                <a:srgbClr val="FFFFFF"/>
+              </a:highlight>
+              <a:latin typeface="Consolas" panose="020B0609020204030204" pitchFamily="49" charset="0"/>
+            </a:endParaRPr>
+          </a:p>
+          <a:p>
+            <a:pPr marL="0" indent="0">
+              <a:buNone/>
+            </a:pPr>
+            <a:r>
+              <a:rPr lang="en-US" dirty="0">
+                <a:solidFill>
+                  <a:srgbClr val="000000"/>
+                </a:solidFill>
+                <a:highlight>
+                  <a:srgbClr val="FFFFFF"/>
+                </a:highlight>
+                <a:latin typeface="Consolas" panose="020B0609020204030204" pitchFamily="49" charset="0"/>
+              </a:rPr>
+              <a:t>       </a:t>
+            </a:r>
+            <a:r>
+              <a:rPr lang="en-US" dirty="0" smtClean="0">
+                <a:solidFill>
+                  <a:srgbClr val="000000"/>
+                </a:solidFill>
+                <a:highlight>
+                  <a:srgbClr val="FFFFFF"/>
+                </a:highlight>
+                <a:latin typeface="Consolas" panose="020B0609020204030204" pitchFamily="49" charset="0"/>
+              </a:rPr>
+              <a:t>{</a:t>
+            </a:r>
+            <a:endParaRPr lang="en-US" dirty="0">
+              <a:solidFill>
+                <a:srgbClr val="000000"/>
+              </a:solidFill>
+              <a:highlight>
+                <a:srgbClr val="FFFFFF"/>
+              </a:highlight>
+              <a:latin typeface="Consolas" panose="020B0609020204030204" pitchFamily="49" charset="0"/>
+            </a:endParaRPr>
+          </a:p>
+          <a:p>
+            <a:pPr marL="0" indent="0">
+              <a:buNone/>
+            </a:pPr>
+            <a:r>
+              <a:rPr lang="en-US" dirty="0">
+                <a:solidFill>
+                  <a:srgbClr val="000000"/>
+                </a:solidFill>
+                <a:highlight>
+                  <a:srgbClr val="FFFFFF"/>
+                </a:highlight>
+                <a:latin typeface="Consolas" panose="020B0609020204030204" pitchFamily="49" charset="0"/>
+              </a:rPr>
+              <a:t>       </a:t>
+            </a:r>
+            <a:r>
+              <a:rPr lang="en-US" dirty="0" smtClean="0">
+                <a:solidFill>
+                  <a:srgbClr val="000000"/>
+                </a:solidFill>
+                <a:highlight>
+                  <a:srgbClr val="FFFFFF"/>
+                </a:highlight>
+                <a:latin typeface="Consolas" panose="020B0609020204030204" pitchFamily="49" charset="0"/>
+              </a:rPr>
+              <a:t>    </a:t>
+            </a:r>
+            <a:r>
+              <a:rPr lang="en-US" dirty="0">
+                <a:solidFill>
+                  <a:srgbClr val="0000FF"/>
+                </a:solidFill>
+                <a:highlight>
+                  <a:srgbClr val="FFFFFF"/>
+                </a:highlight>
+                <a:latin typeface="Consolas" panose="020B0609020204030204" pitchFamily="49" charset="0"/>
+              </a:rPr>
+              <a:t>await</a:t>
+            </a:r>
+            <a:r>
+              <a:rPr lang="en-US" dirty="0">
+                <a:solidFill>
+                  <a:srgbClr val="000000"/>
+                </a:solidFill>
+                <a:highlight>
+                  <a:srgbClr val="FFFFFF"/>
+                </a:highlight>
+                <a:latin typeface="Consolas" panose="020B0609020204030204" pitchFamily="49" charset="0"/>
+              </a:rPr>
+              <a:t> </a:t>
+            </a:r>
+            <a:r>
+              <a:rPr lang="en-US" dirty="0" err="1">
+                <a:solidFill>
+                  <a:srgbClr val="2B91AF"/>
+                </a:solidFill>
+                <a:highlight>
+                  <a:srgbClr val="FFFFFF"/>
+                </a:highlight>
+                <a:latin typeface="Consolas" panose="020B0609020204030204" pitchFamily="49" charset="0"/>
+              </a:rPr>
+              <a:t>Program</a:t>
+            </a:r>
+            <a:r>
+              <a:rPr lang="en-US" dirty="0" err="1">
+                <a:solidFill>
+                  <a:srgbClr val="000000"/>
+                </a:solidFill>
+                <a:highlight>
+                  <a:srgbClr val="FFFFFF"/>
+                </a:highlight>
+                <a:latin typeface="Consolas" panose="020B0609020204030204" pitchFamily="49" charset="0"/>
+              </a:rPr>
+              <a:t>.Log</a:t>
+            </a:r>
+            <a:r>
+              <a:rPr lang="en-US" dirty="0">
+                <a:solidFill>
+                  <a:srgbClr val="000000"/>
+                </a:solidFill>
+                <a:highlight>
+                  <a:srgbClr val="FFFFFF"/>
+                </a:highlight>
+                <a:latin typeface="Consolas" panose="020B0609020204030204" pitchFamily="49" charset="0"/>
+              </a:rPr>
+              <a:t>(</a:t>
+            </a:r>
+            <a:r>
+              <a:rPr lang="en-US" dirty="0">
+                <a:solidFill>
+                  <a:srgbClr val="A31515"/>
+                </a:solidFill>
+                <a:highlight>
+                  <a:srgbClr val="FFFFFF"/>
+                </a:highlight>
+                <a:latin typeface="Consolas" panose="020B0609020204030204" pitchFamily="49" charset="0"/>
+              </a:rPr>
+              <a:t>"In Finally."</a:t>
+            </a:r>
+            <a:r>
+              <a:rPr lang="en-US" dirty="0">
+                <a:solidFill>
+                  <a:srgbClr val="000000"/>
+                </a:solidFill>
+                <a:highlight>
+                  <a:srgbClr val="FFFFFF"/>
+                </a:highlight>
+                <a:latin typeface="Consolas" panose="020B0609020204030204" pitchFamily="49" charset="0"/>
+              </a:rPr>
+              <a:t>);</a:t>
+            </a:r>
+          </a:p>
+          <a:p>
+            <a:pPr marL="0" indent="0">
+              <a:buNone/>
+            </a:pPr>
+            <a:r>
+              <a:rPr lang="en-US" dirty="0">
+                <a:solidFill>
+                  <a:srgbClr val="000000"/>
+                </a:solidFill>
+                <a:highlight>
+                  <a:srgbClr val="FFFFFF"/>
+                </a:highlight>
+                <a:latin typeface="Consolas" panose="020B0609020204030204" pitchFamily="49" charset="0"/>
+              </a:rPr>
+              <a:t>       </a:t>
+            </a:r>
+            <a:r>
+              <a:rPr lang="en-US" dirty="0" smtClean="0">
+                <a:solidFill>
+                  <a:srgbClr val="000000"/>
+                </a:solidFill>
+                <a:highlight>
+                  <a:srgbClr val="FFFFFF"/>
+                </a:highlight>
+                <a:latin typeface="Consolas" panose="020B0609020204030204" pitchFamily="49" charset="0"/>
+              </a:rPr>
+              <a:t>}</a:t>
+            </a:r>
+            <a:endParaRPr lang="en-US" dirty="0"/>
+          </a:p>
+        </p:txBody>
+      </p:sp>
+    </p:spTree>
+    <p:extLst>
+      <p:ext uri="{BB962C8B-B14F-4D97-AF65-F5344CB8AC3E}">
+        <p14:creationId xmlns:p14="http://schemas.microsoft.com/office/powerpoint/2010/main" val="926694415"/>
+      </p:ext>
+    </p:extLst>
+  </p:cSld>
+  <p:clrMapOvr>
+    <a:masterClrMapping/>
+  </p:clrMapOvr>
+</p:sld>
+</file>
+
+<file path=ppt/slides/slide14.xml><?xml version="1.0" encoding="utf-8"?>
+<p:sld xmlns:a="http://schemas.openxmlformats.org/drawingml/2006/main" xmlns:r="http://schemas.openxmlformats.org/officeDocument/2006/relationships" xmlns:p="http://schemas.openxmlformats.org/presentationml/2006/main">
+  <p:cSld>
+    <p:spTree>
+      <p:nvGrpSpPr>
+        <p:cNvPr id="1" name=""/>
+        <p:cNvGrpSpPr/>
+        <p:nvPr/>
+      </p:nvGrpSpPr>
+      <p:grpSpPr>
+        <a:xfrm>
+          <a:off x="0" y="0"/>
+          <a:ext cx="0" cy="0"/>
+          <a:chOff x="0" y="0"/>
+          <a:chExt cx="0" cy="0"/>
+        </a:xfrm>
+      </p:grpSpPr>
+      <p:sp>
+        <p:nvSpPr>
+          <p:cNvPr id="2" name="Title 1"/>
+          <p:cNvSpPr>
+            <a:spLocks noGrp="1"/>
+          </p:cNvSpPr>
+          <p:nvPr>
+            <p:ph type="title"/>
+          </p:nvPr>
+        </p:nvSpPr>
+        <p:spPr/>
+        <p:txBody>
+          <a:bodyPr/>
+          <a:lstStyle/>
+          <a:p>
+            <a:r>
               <a:rPr lang="en-US" dirty="0" smtClean="0"/>
               <a:t>IDE Improvements</a:t>
             </a:r>
@@ -9161,7 +10513,7 @@
 </p:sld>
 </file>
 
-<file path=ppt/slides/slide14.xml><?xml version="1.0" encoding="utf-8"?>
+<file path=ppt/slides/slide15.xml><?xml version="1.0" encoding="utf-8"?>
 <p:sld xmlns:a="http://schemas.openxmlformats.org/drawingml/2006/main" xmlns:r="http://schemas.openxmlformats.org/officeDocument/2006/relationships" xmlns:p="http://schemas.openxmlformats.org/presentationml/2006/main">
   <p:cSld>
     <p:spTree>
@@ -9251,7 +10603,7 @@
 </p:sld>
 </file>
 
-<file path=ppt/slides/slide15.xml><?xml version="1.0" encoding="utf-8"?>
+<file path=ppt/slides/slide16.xml><?xml version="1.0" encoding="utf-8"?>
 <p:sld xmlns:a="http://schemas.openxmlformats.org/drawingml/2006/main" xmlns:r="http://schemas.openxmlformats.org/officeDocument/2006/relationships" xmlns:p="http://schemas.openxmlformats.org/presentationml/2006/main">
   <p:cSld>
     <p:spTree>
@@ -9358,7 +10710,7 @@
 </p:sld>
 </file>
 
-<file path=ppt/slides/slide16.xml><?xml version="1.0" encoding="utf-8"?>
+<file path=ppt/slides/slide17.xml><?xml version="1.0" encoding="utf-8"?>
 <p:sld xmlns:a="http://schemas.openxmlformats.org/drawingml/2006/main" xmlns:r="http://schemas.openxmlformats.org/officeDocument/2006/relationships" xmlns:p="http://schemas.openxmlformats.org/presentationml/2006/main">
   <p:cSld>
     <p:spTree>
@@ -9444,7 +10796,7 @@
 </p:sld>
 </file>
 
-<file path=ppt/slides/slide17.xml><?xml version="1.0" encoding="utf-8"?>
+<file path=ppt/slides/slide18.xml><?xml version="1.0" encoding="utf-8"?>
 <p:sld xmlns:a="http://schemas.openxmlformats.org/drawingml/2006/main" xmlns:r="http://schemas.openxmlformats.org/officeDocument/2006/relationships" xmlns:p="http://schemas.openxmlformats.org/presentationml/2006/main">
   <p:cSld>
     <p:spTree>
@@ -9527,7 +10879,7 @@
 </p:sld>
 </file>
 
-<file path=ppt/slides/slide18.xml><?xml version="1.0" encoding="utf-8"?>
+<file path=ppt/slides/slide19.xml><?xml version="1.0" encoding="utf-8"?>
 <p:sld xmlns:a="http://schemas.openxmlformats.org/drawingml/2006/main" xmlns:r="http://schemas.openxmlformats.org/officeDocument/2006/relationships" xmlns:p="http://schemas.openxmlformats.org/presentationml/2006/main">
   <p:cSld>
     <p:spTree>
@@ -9637,7 +10989,110 @@
 </p:sld>
 </file>
 
-<file path=ppt/slides/slide19.xml><?xml version="1.0" encoding="utf-8"?>
+<file path=ppt/slides/slide2.xml><?xml version="1.0" encoding="utf-8"?>
+<p:sld xmlns:a="http://schemas.openxmlformats.org/drawingml/2006/main" xmlns:r="http://schemas.openxmlformats.org/officeDocument/2006/relationships" xmlns:p="http://schemas.openxmlformats.org/presentationml/2006/main">
+  <p:cSld>
+    <p:spTree>
+      <p:nvGrpSpPr>
+        <p:cNvPr id="1" name=""/>
+        <p:cNvGrpSpPr/>
+        <p:nvPr/>
+      </p:nvGrpSpPr>
+      <p:grpSpPr>
+        <a:xfrm>
+          <a:off x="0" y="0"/>
+          <a:ext cx="0" cy="0"/>
+          <a:chOff x="0" y="0"/>
+          <a:chExt cx="0" cy="0"/>
+        </a:xfrm>
+      </p:grpSpPr>
+      <p:sp>
+        <p:nvSpPr>
+          <p:cNvPr id="2" name="Title 1"/>
+          <p:cNvSpPr>
+            <a:spLocks noGrp="1"/>
+          </p:cNvSpPr>
+          <p:nvPr>
+            <p:ph type="title"/>
+          </p:nvPr>
+        </p:nvSpPr>
+        <p:spPr/>
+        <p:txBody>
+          <a:bodyPr/>
+          <a:lstStyle/>
+          <a:p>
+            <a:r>
+              <a:rPr lang="en-US" dirty="0" smtClean="0"/>
+              <a:t>Overview</a:t>
+            </a:r>
+            <a:endParaRPr lang="en-US" dirty="0"/>
+          </a:p>
+        </p:txBody>
+      </p:sp>
+      <p:sp>
+        <p:nvSpPr>
+          <p:cNvPr id="3" name="Content Placeholder 2"/>
+          <p:cNvSpPr>
+            <a:spLocks noGrp="1"/>
+          </p:cNvSpPr>
+          <p:nvPr>
+            <p:ph idx="1"/>
+          </p:nvPr>
+        </p:nvSpPr>
+        <p:spPr/>
+        <p:txBody>
+          <a:bodyPr/>
+          <a:lstStyle/>
+          <a:p>
+            <a:r>
+              <a:rPr lang="en-US" dirty="0" smtClean="0"/>
+              <a:t>New Language </a:t>
+            </a:r>
+            <a:r>
+              <a:rPr lang="en-US" dirty="0"/>
+              <a:t>F</a:t>
+            </a:r>
+            <a:r>
+              <a:rPr lang="en-US" dirty="0" smtClean="0"/>
+              <a:t>eatures</a:t>
+            </a:r>
+          </a:p>
+          <a:p>
+            <a:r>
+              <a:rPr lang="en-US" dirty="0" smtClean="0"/>
+              <a:t>IDE Improvements</a:t>
+            </a:r>
+          </a:p>
+          <a:p>
+            <a:r>
+              <a:rPr lang="en-US" dirty="0" smtClean="0"/>
+              <a:t>Analysis and Debugging</a:t>
+            </a:r>
+            <a:endParaRPr lang="en-US" dirty="0"/>
+          </a:p>
+        </p:txBody>
+      </p:sp>
+    </p:spTree>
+    <p:extLst>
+      <p:ext uri="{BB962C8B-B14F-4D97-AF65-F5344CB8AC3E}">
+        <p14:creationId xmlns:p14="http://schemas.microsoft.com/office/powerpoint/2010/main" val="1490415066"/>
+      </p:ext>
+    </p:extLst>
+  </p:cSld>
+  <p:clrMapOvr>
+    <a:masterClrMapping/>
+  </p:clrMapOvr>
+  <p:timing>
+    <p:tnLst>
+      <p:par>
+        <p:cTn id="1" dur="indefinite" restart="never" nodeType="tmRoot"/>
+      </p:par>
+    </p:tnLst>
+  </p:timing>
+</p:sld>
+</file>
+
+<file path=ppt/slides/slide20.xml><?xml version="1.0" encoding="utf-8"?>
 <p:sld xmlns:a="http://schemas.openxmlformats.org/drawingml/2006/main" xmlns:r="http://schemas.openxmlformats.org/officeDocument/2006/relationships" xmlns:p="http://schemas.openxmlformats.org/presentationml/2006/main">
   <p:cSld>
     <p:spTree>
@@ -9740,114 +11195,7 @@
 </p:sld>
 </file>
 
-<file path=ppt/slides/slide2.xml><?xml version="1.0" encoding="utf-8"?>
-<p:sld xmlns:a="http://schemas.openxmlformats.org/drawingml/2006/main" xmlns:r="http://schemas.openxmlformats.org/officeDocument/2006/relationships" xmlns:p="http://schemas.openxmlformats.org/presentationml/2006/main">
-  <p:cSld>
-    <p:spTree>
-      <p:nvGrpSpPr>
-        <p:cNvPr id="1" name=""/>
-        <p:cNvGrpSpPr/>
-        <p:nvPr/>
-      </p:nvGrpSpPr>
-      <p:grpSpPr>
-        <a:xfrm>
-          <a:off x="0" y="0"/>
-          <a:ext cx="0" cy="0"/>
-          <a:chOff x="0" y="0"/>
-          <a:chExt cx="0" cy="0"/>
-        </a:xfrm>
-      </p:grpSpPr>
-      <p:sp>
-        <p:nvSpPr>
-          <p:cNvPr id="2" name="Title 1"/>
-          <p:cNvSpPr>
-            <a:spLocks noGrp="1"/>
-          </p:cNvSpPr>
-          <p:nvPr>
-            <p:ph type="title"/>
-          </p:nvPr>
-        </p:nvSpPr>
-        <p:spPr/>
-        <p:txBody>
-          <a:bodyPr/>
-          <a:lstStyle/>
-          <a:p>
-            <a:r>
-              <a:rPr lang="en-US" dirty="0" smtClean="0"/>
-              <a:t>Overview</a:t>
-            </a:r>
-            <a:endParaRPr lang="en-US" dirty="0"/>
-          </a:p>
-        </p:txBody>
-      </p:sp>
-      <p:sp>
-        <p:nvSpPr>
-          <p:cNvPr id="3" name="Content Placeholder 2"/>
-          <p:cNvSpPr>
-            <a:spLocks noGrp="1"/>
-          </p:cNvSpPr>
-          <p:nvPr>
-            <p:ph idx="1"/>
-          </p:nvPr>
-        </p:nvSpPr>
-        <p:spPr/>
-        <p:txBody>
-          <a:bodyPr/>
-          <a:lstStyle/>
-          <a:p>
-            <a:r>
-              <a:rPr lang="en-US" dirty="0" smtClean="0"/>
-              <a:t>New </a:t>
-            </a:r>
-            <a:r>
-              <a:rPr lang="en-US" dirty="0" smtClean="0"/>
-              <a:t>Language </a:t>
-            </a:r>
-            <a:r>
-              <a:rPr lang="en-US" dirty="0"/>
-              <a:t>F</a:t>
-            </a:r>
-            <a:r>
-              <a:rPr lang="en-US" dirty="0" smtClean="0"/>
-              <a:t>eatures</a:t>
-            </a:r>
-          </a:p>
-          <a:p>
-            <a:r>
-              <a:rPr lang="en-US" dirty="0" smtClean="0"/>
-              <a:t>IDE Improvements</a:t>
-            </a:r>
-          </a:p>
-          <a:p>
-            <a:r>
-              <a:rPr lang="en-US" dirty="0" smtClean="0"/>
-              <a:t>Analysis and Debugging</a:t>
-            </a:r>
-            <a:endParaRPr lang="en-US" dirty="0"/>
-          </a:p>
-        </p:txBody>
-      </p:sp>
-    </p:spTree>
-    <p:extLst>
-      <p:ext uri="{BB962C8B-B14F-4D97-AF65-F5344CB8AC3E}">
-        <p14:creationId xmlns:p14="http://schemas.microsoft.com/office/powerpoint/2010/main" val="1490415066"/>
-      </p:ext>
-    </p:extLst>
-  </p:cSld>
-  <p:clrMapOvr>
-    <a:masterClrMapping/>
-  </p:clrMapOvr>
-  <p:timing>
-    <p:tnLst>
-      <p:par>
-        <p:cTn id="1" dur="indefinite" restart="never" nodeType="tmRoot"/>
-      </p:par>
-    </p:tnLst>
-  </p:timing>
-</p:sld>
-</file>
-
-<file path=ppt/slides/slide20.xml><?xml version="1.0" encoding="utf-8"?>
+<file path=ppt/slides/slide21.xml><?xml version="1.0" encoding="utf-8"?>
 <p:sld xmlns:a="http://schemas.openxmlformats.org/drawingml/2006/main" xmlns:r="http://schemas.openxmlformats.org/officeDocument/2006/relationships" xmlns:p="http://schemas.openxmlformats.org/presentationml/2006/main">
   <p:cSld>
     <p:spTree>
@@ -10327,11 +11675,7 @@
           <a:p>
             <a:r>
               <a:rPr lang="en-US" dirty="0" smtClean="0"/>
-              <a:t>Initialize like a </a:t>
-            </a:r>
-            <a:r>
-              <a:rPr lang="en-US" dirty="0" smtClean="0"/>
-              <a:t>field</a:t>
+              <a:t>Initialize like a field</a:t>
             </a:r>
           </a:p>
           <a:p>
@@ -10592,11 +11936,7 @@
           <a:p>
             <a:r>
               <a:rPr lang="en-US" dirty="0" smtClean="0"/>
-              <a:t>Familiar formatting </a:t>
-            </a:r>
-            <a:r>
-              <a:rPr lang="en-US" dirty="0" smtClean="0"/>
-              <a:t>available</a:t>
+              <a:t>Familiar formatting available</a:t>
             </a:r>
           </a:p>
           <a:p>
@@ -10861,11 +12201,7 @@
           <a:p>
             <a:r>
               <a:rPr lang="en-US" dirty="0" smtClean="0"/>
-              <a:t>Shorter syntax for common </a:t>
-            </a:r>
-            <a:r>
-              <a:rPr lang="en-US" dirty="0" smtClean="0"/>
-              <a:t>classes</a:t>
+              <a:t>Shorter syntax for common classes</a:t>
             </a:r>
           </a:p>
           <a:p>
@@ -11400,11 +12736,7 @@
           <a:p>
             <a:r>
               <a:rPr lang="en-US" dirty="0" smtClean="0"/>
-              <a:t>Convenient syntax for </a:t>
-            </a:r>
-            <a:r>
-              <a:rPr lang="en-US" dirty="0" smtClean="0"/>
-              <a:t>dictionaries</a:t>
+              <a:t>Convenient syntax for dictionaries</a:t>
             </a:r>
           </a:p>
           <a:p>
@@ -11983,11 +13315,7 @@
           <a:p>
             <a:r>
               <a:rPr lang="en-US" dirty="0" smtClean="0"/>
-              <a:t>Operators </a:t>
-            </a:r>
-            <a:r>
-              <a:rPr lang="en-US" dirty="0" smtClean="0"/>
-              <a:t>too</a:t>
+              <a:t>Operators too</a:t>
             </a:r>
           </a:p>
           <a:p>
@@ -12034,43 +13362,43 @@
                 </a:highlight>
                 <a:latin typeface="Consolas" panose="020B0609020204030204" pitchFamily="49" charset="0"/>
               </a:rPr>
-              <a:t>decimal</a:t>
-            </a:r>
-            <a:r>
-              <a:rPr lang="en-US" dirty="0">
-                <a:solidFill>
-                  <a:srgbClr val="000000"/>
-                </a:solidFill>
-                <a:highlight>
-                  <a:srgbClr val="FFFFFF"/>
-                </a:highlight>
-                <a:latin typeface="Consolas" panose="020B0609020204030204" pitchFamily="49" charset="0"/>
-              </a:rPr>
-              <a:t> Price { </a:t>
-            </a:r>
-            <a:r>
-              <a:rPr lang="en-US" dirty="0">
-                <a:solidFill>
-                  <a:srgbClr val="0000FF"/>
-                </a:solidFill>
-                <a:highlight>
-                  <a:srgbClr val="FFFFFF"/>
-                </a:highlight>
-                <a:latin typeface="Consolas" panose="020B0609020204030204" pitchFamily="49" charset="0"/>
-              </a:rPr>
-              <a:t>get</a:t>
-            </a:r>
-            <a:r>
-              <a:rPr lang="en-US" dirty="0">
-                <a:solidFill>
-                  <a:srgbClr val="000000"/>
-                </a:solidFill>
-                <a:highlight>
-                  <a:srgbClr val="FFFFFF"/>
-                </a:highlight>
-                <a:latin typeface="Consolas" panose="020B0609020204030204" pitchFamily="49" charset="0"/>
-              </a:rPr>
-              <a:t>; } = 3.25m;</a:t>
+              <a:t>string</a:t>
+            </a:r>
+            <a:r>
+              <a:rPr lang="en-US" dirty="0">
+                <a:solidFill>
+                  <a:srgbClr val="000000"/>
+                </a:solidFill>
+                <a:highlight>
+                  <a:srgbClr val="FFFFFF"/>
+                </a:highlight>
+                <a:latin typeface="Consolas" panose="020B0609020204030204" pitchFamily="49" charset="0"/>
+              </a:rPr>
+              <a:t>[] Ingredients =&gt; </a:t>
+            </a:r>
+            <a:r>
+              <a:rPr lang="en-US" dirty="0" err="1">
+                <a:solidFill>
+                  <a:srgbClr val="000000"/>
+                </a:solidFill>
+                <a:highlight>
+                  <a:srgbClr val="FFFFFF"/>
+                </a:highlight>
+                <a:latin typeface="Consolas" panose="020B0609020204030204" pitchFamily="49" charset="0"/>
+              </a:rPr>
+              <a:t>IngredientAmounts.Keys.ToArray</a:t>
+            </a:r>
+            <a:r>
+              <a:rPr lang="en-US" dirty="0">
+                <a:solidFill>
+                  <a:srgbClr val="000000"/>
+                </a:solidFill>
+                <a:highlight>
+                  <a:srgbClr val="FFFFFF"/>
+                </a:highlight>
+                <a:latin typeface="Consolas" panose="020B0609020204030204" pitchFamily="49" charset="0"/>
+              </a:rPr>
+              <a:t>();</a:t>
             </a:r>
             <a:endParaRPr lang="en-US" dirty="0"/>
           </a:p>
@@ -12337,4 +13665,265 @@
     </a:ext>
   </a:extLst>
 </a:theme>
+</file>
+
+<file path=ppt/theme/theme2.xml><?xml version="1.0" encoding="utf-8"?>
+<a:theme xmlns:a="http://schemas.openxmlformats.org/drawingml/2006/main" name="Office Theme">
+  <a:themeElements>
+    <a:clrScheme name="Office">
+      <a:dk1>
+        <a:sysClr val="windowText" lastClr="000000"/>
+      </a:dk1>
+      <a:lt1>
+        <a:sysClr val="window" lastClr="FFFFFF"/>
+      </a:lt1>
+      <a:dk2>
+        <a:srgbClr val="44546A"/>
+      </a:dk2>
+      <a:lt2>
+        <a:srgbClr val="E7E6E6"/>
+      </a:lt2>
+      <a:accent1>
+        <a:srgbClr val="5B9BD5"/>
+      </a:accent1>
+      <a:accent2>
+        <a:srgbClr val="ED7D31"/>
+      </a:accent2>
+      <a:accent3>
+        <a:srgbClr val="A5A5A5"/>
+      </a:accent3>
+      <a:accent4>
+        <a:srgbClr val="FFC000"/>
+      </a:accent4>
+      <a:accent5>
+        <a:srgbClr val="4472C4"/>
+      </a:accent5>
+      <a:accent6>
+        <a:srgbClr val="70AD47"/>
+      </a:accent6>
+      <a:hlink>
+        <a:srgbClr val="0563C1"/>
+      </a:hlink>
+      <a:folHlink>
+        <a:srgbClr val="954F72"/>
+      </a:folHlink>
+    </a:clrScheme>
+    <a:fontScheme name="Office">
+      <a:majorFont>
+        <a:latin typeface="Calibri Light" panose="020F0302020204030204"/>
+        <a:ea typeface=""/>
+        <a:cs typeface=""/>
+        <a:font script="Jpan" typeface="ＭＳ Ｐゴシック"/>
+        <a:font script="Hang" typeface="맑은 고딕"/>
+        <a:font script="Hans" typeface="宋体"/>
+        <a:font script="Hant" typeface="新細明體"/>
+        <a:font script="Arab" typeface="Times New Roman"/>
+        <a:font script="Hebr" typeface="Times New Roman"/>
+        <a:font script="Thai" typeface="Angsana New"/>
+        <a:font script="Ethi" typeface="Nyala"/>
+        <a:font script="Beng" typeface="Vrinda"/>
+        <a:font script="Gujr" typeface="Shruti"/>
+        <a:font script="Khmr" typeface="MoolBoran"/>
+        <a:font script="Knda" typeface="Tunga"/>
+        <a:font script="Guru" typeface="Raavi"/>
+        <a:font script="Cans" typeface="Euphemia"/>
+        <a:font script="Cher" typeface="Plantagenet Cherokee"/>
+        <a:font script="Yiii" typeface="Microsoft Yi Baiti"/>
+        <a:font script="Tibt" typeface="Microsoft Himalaya"/>
+        <a:font script="Thaa" typeface="MV Boli"/>
+        <a:font script="Deva" typeface="Mangal"/>
+        <a:font script="Telu" typeface="Gautami"/>
+        <a:font script="Taml" typeface="Latha"/>
+        <a:font script="Syrc" typeface="Estrangelo Edessa"/>
+        <a:font script="Orya" typeface="Kalinga"/>
+        <a:font script="Mlym" typeface="Kartika"/>
+        <a:font script="Laoo" typeface="DokChampa"/>
+        <a:font script="Sinh" typeface="Iskoola Pota"/>
+        <a:font script="Mong" typeface="Mongolian Baiti"/>
+        <a:font script="Viet" typeface="Times New Roman"/>
+        <a:font script="Uigh" typeface="Microsoft Uighur"/>
+        <a:font script="Geor" typeface="Sylfaen"/>
+      </a:majorFont>
+      <a:minorFont>
+        <a:latin typeface="Calibri" panose="020F0502020204030204"/>
+        <a:ea typeface=""/>
+        <a:cs typeface=""/>
+        <a:font script="Jpan" typeface="ＭＳ Ｐゴシック"/>
+        <a:font script="Hang" typeface="맑은 고딕"/>
+        <a:font script="Hans" typeface="宋体"/>
+        <a:font script="Hant" typeface="新細明體"/>
+        <a:font script="Arab" typeface="Arial"/>
+        <a:font script="Hebr" typeface="Arial"/>
+        <a:font script="Thai" typeface="Cordia New"/>
+        <a:font script="Ethi" typeface="Nyala"/>
+        <a:font script="Beng" typeface="Vrinda"/>
+        <a:font script="Gujr" typeface="Shruti"/>
+        <a:font script="Khmr" typeface="DaunPenh"/>
+        <a:font script="Knda" typeface="Tunga"/>
+        <a:font script="Guru" typeface="Raavi"/>
+        <a:font script="Cans" typeface="Euphemia"/>
+        <a:font script="Cher" typeface="Plantagenet Cherokee"/>
+        <a:font script="Yiii" typeface="Microsoft Yi Baiti"/>
+        <a:font script="Tibt" typeface="Microsoft Himalaya"/>
+        <a:font script="Thaa" typeface="MV Boli"/>
+        <a:font script="Deva" typeface="Mangal"/>
+        <a:font script="Telu" typeface="Gautami"/>
+        <a:font script="Taml" typeface="Latha"/>
+        <a:font script="Syrc" typeface="Estrangelo Edessa"/>
+        <a:font script="Orya" typeface="Kalinga"/>
+        <a:font script="Mlym" typeface="Kartika"/>
+        <a:font script="Laoo" typeface="DokChampa"/>
+        <a:font script="Sinh" typeface="Iskoola Pota"/>
+        <a:font script="Mong" typeface="Mongolian Baiti"/>
+        <a:font script="Viet" typeface="Arial"/>
+        <a:font script="Uigh" typeface="Microsoft Uighur"/>
+        <a:font script="Geor" typeface="Sylfaen"/>
+      </a:minorFont>
+    </a:fontScheme>
+    <a:fmtScheme name="Office">
+      <a:fillStyleLst>
+        <a:solidFill>
+          <a:schemeClr val="phClr"/>
+        </a:solidFill>
+        <a:gradFill rotWithShape="1">
+          <a:gsLst>
+            <a:gs pos="0">
+              <a:schemeClr val="phClr">
+                <a:lumMod val="110000"/>
+                <a:satMod val="105000"/>
+                <a:tint val="67000"/>
+              </a:schemeClr>
+            </a:gs>
+            <a:gs pos="50000">
+              <a:schemeClr val="phClr">
+                <a:lumMod val="105000"/>
+                <a:satMod val="103000"/>
+                <a:tint val="73000"/>
+              </a:schemeClr>
+            </a:gs>
+            <a:gs pos="100000">
+              <a:schemeClr val="phClr">
+                <a:lumMod val="105000"/>
+                <a:satMod val="109000"/>
+                <a:tint val="81000"/>
+              </a:schemeClr>
+            </a:gs>
+          </a:gsLst>
+          <a:lin ang="5400000" scaled="0"/>
+        </a:gradFill>
+        <a:gradFill rotWithShape="1">
+          <a:gsLst>
+            <a:gs pos="0">
+              <a:schemeClr val="phClr">
+                <a:satMod val="103000"/>
+                <a:lumMod val="102000"/>
+                <a:tint val="94000"/>
+              </a:schemeClr>
+            </a:gs>
+            <a:gs pos="50000">
+              <a:schemeClr val="phClr">
+                <a:satMod val="110000"/>
+                <a:lumMod val="100000"/>
+                <a:shade val="100000"/>
+              </a:schemeClr>
+            </a:gs>
+            <a:gs pos="100000">
+              <a:schemeClr val="phClr">
+                <a:lumMod val="99000"/>
+                <a:satMod val="120000"/>
+                <a:shade val="78000"/>
+              </a:schemeClr>
+            </a:gs>
+          </a:gsLst>
+          <a:lin ang="5400000" scaled="0"/>
+        </a:gradFill>
+      </a:fillStyleLst>
+      <a:lnStyleLst>
+        <a:ln w="6350" cap="flat" cmpd="sng" algn="ctr">
+          <a:solidFill>
+            <a:schemeClr val="phClr"/>
+          </a:solidFill>
+          <a:prstDash val="solid"/>
+          <a:miter lim="800000"/>
+        </a:ln>
+        <a:ln w="12700" cap="flat" cmpd="sng" algn="ctr">
+          <a:solidFill>
+            <a:schemeClr val="phClr"/>
+          </a:solidFill>
+          <a:prstDash val="solid"/>
+          <a:miter lim="800000"/>
+        </a:ln>
+        <a:ln w="19050" cap="flat" cmpd="sng" algn="ctr">
+          <a:solidFill>
+            <a:schemeClr val="phClr"/>
+          </a:solidFill>
+          <a:prstDash val="solid"/>
+          <a:miter lim="800000"/>
+        </a:ln>
+      </a:lnStyleLst>
+      <a:effectStyleLst>
+        <a:effectStyle>
+          <a:effectLst/>
+        </a:effectStyle>
+        <a:effectStyle>
+          <a:effectLst/>
+        </a:effectStyle>
+        <a:effectStyle>
+          <a:effectLst>
+            <a:outerShdw blurRad="57150" dist="19050" dir="5400000" algn="ctr" rotWithShape="0">
+              <a:srgbClr val="000000">
+                <a:alpha val="63000"/>
+              </a:srgbClr>
+            </a:outerShdw>
+          </a:effectLst>
+        </a:effectStyle>
+      </a:effectStyleLst>
+      <a:bgFillStyleLst>
+        <a:solidFill>
+          <a:schemeClr val="phClr"/>
+        </a:solidFill>
+        <a:solidFill>
+          <a:schemeClr val="phClr">
+            <a:tint val="95000"/>
+            <a:satMod val="170000"/>
+          </a:schemeClr>
+        </a:solidFill>
+        <a:gradFill rotWithShape="1">
+          <a:gsLst>
+            <a:gs pos="0">
+              <a:schemeClr val="phClr">
+                <a:tint val="93000"/>
+                <a:satMod val="150000"/>
+                <a:shade val="98000"/>
+                <a:lumMod val="102000"/>
+              </a:schemeClr>
+            </a:gs>
+            <a:gs pos="50000">
+              <a:schemeClr val="phClr">
+                <a:tint val="98000"/>
+                <a:satMod val="130000"/>
+                <a:shade val="90000"/>
+                <a:lumMod val="103000"/>
+              </a:schemeClr>
+            </a:gs>
+            <a:gs pos="100000">
+              <a:schemeClr val="phClr">
+                <a:shade val="63000"/>
+                <a:satMod val="120000"/>
+              </a:schemeClr>
+            </a:gs>
+          </a:gsLst>
+          <a:lin ang="5400000" scaled="0"/>
+        </a:gradFill>
+      </a:bgFillStyleLst>
+    </a:fmtScheme>
+  </a:themeElements>
+  <a:objectDefaults/>
+  <a:extraClrSchemeLst/>
+  <a:extLst>
+    <a:ext uri="{05A4C25C-085E-4340-85A3-A5531E510DB2}">
+      <thm15:themeFamily xmlns:thm15="http://schemas.microsoft.com/office/thememl/2012/main" name="Office Theme" id="{62F939B6-93AF-4DB8-9C6B-D6C7DFDC589F}" vid="{4A3C46E8-61CC-4603-A589-7422A47A8E4A}"/>
+    </a:ext>
+  </a:extLst>
+</a:theme>
 </file>
</xml_diff>